<commit_message>
Common Parameters and Logic Statements
</commit_message>
<xml_diff>
--- a/PowerShell Fundamentals 2.pptx
+++ b/PowerShell Fundamentals 2.pptx
@@ -5,7 +5,7 @@
     <p:sldMasterId id="2147483734" r:id="rId1"/>
   </p:sldMasterIdLst>
   <p:notesMasterIdLst>
-    <p:notesMasterId r:id="rId14"/>
+    <p:notesMasterId r:id="rId18"/>
   </p:notesMasterIdLst>
   <p:sldIdLst>
     <p:sldId id="267" r:id="rId2"/>
@@ -16,10 +16,14 @@
     <p:sldId id="262" r:id="rId7"/>
     <p:sldId id="263" r:id="rId8"/>
     <p:sldId id="264" r:id="rId9"/>
-    <p:sldId id="268" r:id="rId10"/>
-    <p:sldId id="260" r:id="rId11"/>
-    <p:sldId id="265" r:id="rId12"/>
-    <p:sldId id="266" r:id="rId13"/>
+    <p:sldId id="269" r:id="rId10"/>
+    <p:sldId id="270" r:id="rId11"/>
+    <p:sldId id="271" r:id="rId12"/>
+    <p:sldId id="272" r:id="rId13"/>
+    <p:sldId id="268" r:id="rId14"/>
+    <p:sldId id="260" r:id="rId15"/>
+    <p:sldId id="265" r:id="rId16"/>
+    <p:sldId id="266" r:id="rId17"/>
   </p:sldIdLst>
   <p:sldSz cx="12192000" cy="6858000"/>
   <p:notesSz cx="6858000" cy="9144000"/>
@@ -439,8 +443,8 @@
   </pc:docChgLst>
   <pc:docChgLst>
     <pc:chgData name="David Littlejohn" userId="1a0871b5c88a1c81" providerId="LiveId" clId="{2DC3D7F2-6145-4FCB-B171-31D044DEE84F}"/>
-    <pc:docChg chg="undo custSel delSld modSld">
-      <pc:chgData name="David Littlejohn" userId="1a0871b5c88a1c81" providerId="LiveId" clId="{2DC3D7F2-6145-4FCB-B171-31D044DEE84F}" dt="2019-07-25T21:18:32.225" v="1361" actId="20577"/>
+    <pc:docChg chg="undo custSel addSld delSld modSld">
+      <pc:chgData name="David Littlejohn" userId="1a0871b5c88a1c81" providerId="LiveId" clId="{2DC3D7F2-6145-4FCB-B171-31D044DEE84F}" dt="2019-08-04T16:44:51.497" v="2130" actId="20577"/>
       <pc:docMkLst>
         <pc:docMk/>
       </pc:docMkLst>
@@ -459,8 +463,8 @@
           </ac:spMkLst>
         </pc:spChg>
       </pc:sldChg>
-      <pc:sldChg chg="modSp">
-        <pc:chgData name="David Littlejohn" userId="1a0871b5c88a1c81" providerId="LiveId" clId="{2DC3D7F2-6145-4FCB-B171-31D044DEE84F}" dt="2019-07-25T20:39:12.241" v="346" actId="20577"/>
+      <pc:sldChg chg="modSp modNotesTx">
+        <pc:chgData name="David Littlejohn" userId="1a0871b5c88a1c81" providerId="LiveId" clId="{2DC3D7F2-6145-4FCB-B171-31D044DEE84F}" dt="2019-08-04T16:06:49.850" v="1363" actId="20577"/>
         <pc:sldMkLst>
           <pc:docMk/>
           <pc:sldMk cId="311011863" sldId="257"/>
@@ -482,15 +486,8 @@
           </ac:spMkLst>
         </pc:spChg>
       </pc:sldChg>
-      <pc:sldChg chg="del">
-        <pc:chgData name="David Littlejohn" userId="1a0871b5c88a1c81" providerId="LiveId" clId="{2DC3D7F2-6145-4FCB-B171-31D044DEE84F}" dt="2019-07-25T20:39:22.603" v="347" actId="2696"/>
-        <pc:sldMkLst>
-          <pc:docMk/>
-          <pc:sldMk cId="1560917551" sldId="258"/>
-        </pc:sldMkLst>
-      </pc:sldChg>
-      <pc:sldChg chg="modSp">
-        <pc:chgData name="David Littlejohn" userId="1a0871b5c88a1c81" providerId="LiveId" clId="{2DC3D7F2-6145-4FCB-B171-31D044DEE84F}" dt="2019-07-25T21:02:59.073" v="614" actId="20577"/>
+      <pc:sldChg chg="modSp modNotesTx">
+        <pc:chgData name="David Littlejohn" userId="1a0871b5c88a1c81" providerId="LiveId" clId="{2DC3D7F2-6145-4FCB-B171-31D044DEE84F}" dt="2019-08-04T16:06:46.052" v="1362" actId="20577"/>
         <pc:sldMkLst>
           <pc:docMk/>
           <pc:sldMk cId="2866318210" sldId="259"/>
@@ -513,13 +510,13 @@
         </pc:spChg>
       </pc:sldChg>
       <pc:sldChg chg="modSp">
-        <pc:chgData name="David Littlejohn" userId="1a0871b5c88a1c81" providerId="LiveId" clId="{2DC3D7F2-6145-4FCB-B171-31D044DEE84F}" dt="2019-07-25T21:14:48.312" v="940" actId="20577"/>
+        <pc:chgData name="David Littlejohn" userId="1a0871b5c88a1c81" providerId="LiveId" clId="{2DC3D7F2-6145-4FCB-B171-31D044DEE84F}" dt="2019-08-04T16:11:34.639" v="1383"/>
         <pc:sldMkLst>
           <pc:docMk/>
           <pc:sldMk cId="3846218459" sldId="260"/>
         </pc:sldMkLst>
         <pc:spChg chg="mod">
-          <ac:chgData name="David Littlejohn" userId="1a0871b5c88a1c81" providerId="LiveId" clId="{2DC3D7F2-6145-4FCB-B171-31D044DEE84F}" dt="2019-07-25T21:14:48.312" v="940" actId="20577"/>
+          <ac:chgData name="David Littlejohn" userId="1a0871b5c88a1c81" providerId="LiveId" clId="{2DC3D7F2-6145-4FCB-B171-31D044DEE84F}" dt="2019-08-04T16:11:34.639" v="1383"/>
           <ac:spMkLst>
             <pc:docMk/>
             <pc:sldMk cId="3846218459" sldId="260"/>
@@ -565,8 +562,8 @@
           </ac:spMkLst>
         </pc:spChg>
       </pc:sldChg>
-      <pc:sldChg chg="modSp">
-        <pc:chgData name="David Littlejohn" userId="1a0871b5c88a1c81" providerId="LiveId" clId="{2DC3D7F2-6145-4FCB-B171-31D044DEE84F}" dt="2019-07-25T21:04:52.382" v="923" actId="20577"/>
+      <pc:sldChg chg="modSp modNotesTx">
+        <pc:chgData name="David Littlejohn" userId="1a0871b5c88a1c81" providerId="LiveId" clId="{2DC3D7F2-6145-4FCB-B171-31D044DEE84F}" dt="2019-08-04T16:06:58.056" v="1364" actId="20577"/>
         <pc:sldMkLst>
           <pc:docMk/>
           <pc:sldMk cId="1251765685" sldId="263"/>
@@ -619,13 +616,13 @@
         </pc:spChg>
       </pc:sldChg>
       <pc:sldChg chg="modSp">
-        <pc:chgData name="David Littlejohn" userId="1a0871b5c88a1c81" providerId="LiveId" clId="{2DC3D7F2-6145-4FCB-B171-31D044DEE84F}" dt="2019-07-25T21:16:38.195" v="1031" actId="20577"/>
+        <pc:chgData name="David Littlejohn" userId="1a0871b5c88a1c81" providerId="LiveId" clId="{2DC3D7F2-6145-4FCB-B171-31D044DEE84F}" dt="2019-08-04T16:44:51.497" v="2130" actId="20577"/>
         <pc:sldMkLst>
           <pc:docMk/>
           <pc:sldMk cId="3752931151" sldId="266"/>
         </pc:sldMkLst>
         <pc:spChg chg="mod">
-          <ac:chgData name="David Littlejohn" userId="1a0871b5c88a1c81" providerId="LiveId" clId="{2DC3D7F2-6145-4FCB-B171-31D044DEE84F}" dt="2019-07-25T21:16:38.195" v="1031" actId="20577"/>
+          <ac:chgData name="David Littlejohn" userId="1a0871b5c88a1c81" providerId="LiveId" clId="{2DC3D7F2-6145-4FCB-B171-31D044DEE84F}" dt="2019-08-04T16:44:51.497" v="2130" actId="20577"/>
           <ac:spMkLst>
             <pc:docMk/>
             <pc:sldMk cId="3752931151" sldId="266"/>
@@ -663,6 +660,97 @@
           </ac:spMkLst>
         </pc:spChg>
       </pc:sldChg>
+      <pc:sldChg chg="modSp add">
+        <pc:chgData name="David Littlejohn" userId="1a0871b5c88a1c81" providerId="LiveId" clId="{2DC3D7F2-6145-4FCB-B171-31D044DEE84F}" dt="2019-08-04T16:14:59.843" v="1709" actId="20577"/>
+        <pc:sldMkLst>
+          <pc:docMk/>
+          <pc:sldMk cId="2779347125" sldId="269"/>
+        </pc:sldMkLst>
+        <pc:spChg chg="mod">
+          <ac:chgData name="David Littlejohn" userId="1a0871b5c88a1c81" providerId="LiveId" clId="{2DC3D7F2-6145-4FCB-B171-31D044DEE84F}" dt="2019-08-04T16:10:51.502" v="1382" actId="20577"/>
+          <ac:spMkLst>
+            <pc:docMk/>
+            <pc:sldMk cId="2779347125" sldId="269"/>
+            <ac:spMk id="2" creationId="{6479F861-8A98-4E1F-8F7E-3CA416C43E80}"/>
+          </ac:spMkLst>
+        </pc:spChg>
+        <pc:spChg chg="mod">
+          <ac:chgData name="David Littlejohn" userId="1a0871b5c88a1c81" providerId="LiveId" clId="{2DC3D7F2-6145-4FCB-B171-31D044DEE84F}" dt="2019-08-04T16:14:59.843" v="1709" actId="20577"/>
+          <ac:spMkLst>
+            <pc:docMk/>
+            <pc:sldMk cId="2779347125" sldId="269"/>
+            <ac:spMk id="3" creationId="{1D8E89C9-E63C-4CAF-A265-3BEA08F979F0}"/>
+          </ac:spMkLst>
+        </pc:spChg>
+      </pc:sldChg>
+      <pc:sldChg chg="modSp add">
+        <pc:chgData name="David Littlejohn" userId="1a0871b5c88a1c81" providerId="LiveId" clId="{2DC3D7F2-6145-4FCB-B171-31D044DEE84F}" dt="2019-08-04T16:15:11.007" v="1736" actId="20577"/>
+        <pc:sldMkLst>
+          <pc:docMk/>
+          <pc:sldMk cId="288791099" sldId="270"/>
+        </pc:sldMkLst>
+        <pc:spChg chg="mod">
+          <ac:chgData name="David Littlejohn" userId="1a0871b5c88a1c81" providerId="LiveId" clId="{2DC3D7F2-6145-4FCB-B171-31D044DEE84F}" dt="2019-08-04T16:15:11.007" v="1736" actId="20577"/>
+          <ac:spMkLst>
+            <pc:docMk/>
+            <pc:sldMk cId="288791099" sldId="270"/>
+            <ac:spMk id="2" creationId="{2690E908-172A-4937-BD8F-9D4757B9318C}"/>
+          </ac:spMkLst>
+        </pc:spChg>
+      </pc:sldChg>
+      <pc:sldChg chg="modSp add">
+        <pc:chgData name="David Littlejohn" userId="1a0871b5c88a1c81" providerId="LiveId" clId="{2DC3D7F2-6145-4FCB-B171-31D044DEE84F}" dt="2019-08-04T16:27:18.202" v="1916" actId="20577"/>
+        <pc:sldMkLst>
+          <pc:docMk/>
+          <pc:sldMk cId="2911154948" sldId="271"/>
+        </pc:sldMkLst>
+        <pc:spChg chg="mod">
+          <ac:chgData name="David Littlejohn" userId="1a0871b5c88a1c81" providerId="LiveId" clId="{2DC3D7F2-6145-4FCB-B171-31D044DEE84F}" dt="2019-08-04T16:24:51.304" v="1757" actId="20577"/>
+          <ac:spMkLst>
+            <pc:docMk/>
+            <pc:sldMk cId="2911154948" sldId="271"/>
+            <ac:spMk id="2" creationId="{500EBBEA-0F88-4D9D-B141-3AEF4906C399}"/>
+          </ac:spMkLst>
+        </pc:spChg>
+        <pc:spChg chg="mod">
+          <ac:chgData name="David Littlejohn" userId="1a0871b5c88a1c81" providerId="LiveId" clId="{2DC3D7F2-6145-4FCB-B171-31D044DEE84F}" dt="2019-08-04T16:27:18.202" v="1916" actId="20577"/>
+          <ac:spMkLst>
+            <pc:docMk/>
+            <pc:sldMk cId="2911154948" sldId="271"/>
+            <ac:spMk id="3" creationId="{02A1F441-944D-4A05-9638-A1DF101B706C}"/>
+          </ac:spMkLst>
+        </pc:spChg>
+      </pc:sldChg>
+      <pc:sldChg chg="modSp add">
+        <pc:chgData name="David Littlejohn" userId="1a0871b5c88a1c81" providerId="LiveId" clId="{2DC3D7F2-6145-4FCB-B171-31D044DEE84F}" dt="2019-08-04T16:27:38.657" v="1942" actId="20577"/>
+        <pc:sldMkLst>
+          <pc:docMk/>
+          <pc:sldMk cId="2862849544" sldId="272"/>
+        </pc:sldMkLst>
+        <pc:spChg chg="mod">
+          <ac:chgData name="David Littlejohn" userId="1a0871b5c88a1c81" providerId="LiveId" clId="{2DC3D7F2-6145-4FCB-B171-31D044DEE84F}" dt="2019-08-04T16:27:38.657" v="1942" actId="20577"/>
+          <ac:spMkLst>
+            <pc:docMk/>
+            <pc:sldMk cId="2862849544" sldId="272"/>
+            <ac:spMk id="2" creationId="{9F9C06FF-F88A-4AB0-AB3D-AB7D891F8578}"/>
+          </ac:spMkLst>
+        </pc:spChg>
+      </pc:sldChg>
+      <pc:sldChg chg="modSp add del">
+        <pc:chgData name="David Littlejohn" userId="1a0871b5c88a1c81" providerId="LiveId" clId="{2DC3D7F2-6145-4FCB-B171-31D044DEE84F}" dt="2019-08-04T16:43:23.463" v="1954" actId="2696"/>
+        <pc:sldMkLst>
+          <pc:docMk/>
+          <pc:sldMk cId="3223007324" sldId="273"/>
+        </pc:sldMkLst>
+        <pc:spChg chg="mod">
+          <ac:chgData name="David Littlejohn" userId="1a0871b5c88a1c81" providerId="LiveId" clId="{2DC3D7F2-6145-4FCB-B171-31D044DEE84F}" dt="2019-08-04T16:43:20.056" v="1953" actId="20577"/>
+          <ac:spMkLst>
+            <pc:docMk/>
+            <pc:sldMk cId="3223007324" sldId="273"/>
+            <ac:spMk id="2" creationId="{B8CFC077-5CB3-4D41-A173-5D1C23B5AB97}"/>
+          </ac:spMkLst>
+        </pc:spChg>
+      </pc:sldChg>
     </pc:docChg>
   </pc:docChgLst>
 </pc:chgInfo>
@@ -750,7 +838,7 @@
           <a:p>
             <a:fld id="{F8CB840B-AE6F-4482-9BDB-EDAB9756A2FA}" type="datetimeFigureOut">
               <a:rPr lang="en-US" smtClean="0"/>
-              <a:t>7/25/2019</a:t>
+              <a:t>8/4/2019</a:t>
             </a:fld>
             <a:endParaRPr lang="en-US"/>
           </a:p>
@@ -1061,22 +1149,7 @@
           <a:bodyPr/>
           <a:lstStyle/>
           <a:p>
-            <a:r>
-              <a:rPr lang="en-US" dirty="0"/>
-              <a:t>PowerShell does not ship with all of the help files to lower the size of the install</a:t>
-            </a:r>
-          </a:p>
-          <a:p>
-            <a:r>
-              <a:rPr lang="en-US" dirty="0"/>
-              <a:t>Update should be run as administrator as the files are laid down in the system folders</a:t>
-            </a:r>
-          </a:p>
-          <a:p>
-            <a:r>
-              <a:rPr lang="en-US" dirty="0"/>
-              <a:t>Title is song lyrics from The Beatles</a:t>
-            </a:r>
+            <a:endParaRPr lang="en-US" dirty="0"/>
           </a:p>
         </p:txBody>
       </p:sp>
@@ -1160,18 +1233,6 @@
           <a:bodyPr/>
           <a:lstStyle/>
           <a:p>
-            <a:r>
-              <a:rPr lang="en-US" dirty="0"/>
-              <a:t>Should feel confident now to explore what commands we can run in PowerShell</a:t>
-            </a:r>
-          </a:p>
-          <a:p>
-            <a:r>
-              <a:rPr lang="en-US" dirty="0"/>
-              <a:t>The title is intended to be song lyrics from the band Lakeside</a:t>
-            </a:r>
-          </a:p>
-          <a:p>
             <a:endParaRPr lang="en-US" dirty="0"/>
           </a:p>
         </p:txBody>
@@ -1256,16 +1317,7 @@
           <a:bodyPr/>
           <a:lstStyle/>
           <a:p>
-            <a:r>
-              <a:rPr lang="en-US" dirty="0"/>
-              <a:t>Dogs have properties such as four legs, fur color, different breeds</a:t>
-            </a:r>
-          </a:p>
-          <a:p>
-            <a:r>
-              <a:rPr lang="en-US" dirty="0"/>
-              <a:t>Dogs have methods such as bark, walk, sit</a:t>
-            </a:r>
+            <a:endParaRPr lang="en-US" dirty="0"/>
           </a:p>
         </p:txBody>
       </p:sp>
@@ -2027,7 +2079,7 @@
           <a:p>
             <a:fld id="{5FC93890-602C-48CB-AE8E-BB8867784A0C}" type="datetimeFigureOut">
               <a:rPr lang="en-US" smtClean="0"/>
-              <a:t>7/25/2019</a:t>
+              <a:t>8/4/2019</a:t>
             </a:fld>
             <a:endParaRPr lang="en-US"/>
           </a:p>
@@ -2278,7 +2330,7 @@
           <a:p>
             <a:fld id="{5FC93890-602C-48CB-AE8E-BB8867784A0C}" type="datetimeFigureOut">
               <a:rPr lang="en-US" smtClean="0"/>
-              <a:t>7/25/2019</a:t>
+              <a:t>8/4/2019</a:t>
             </a:fld>
             <a:endParaRPr lang="en-US"/>
           </a:p>
@@ -2592,7 +2644,7 @@
           <a:p>
             <a:fld id="{5FC93890-602C-48CB-AE8E-BB8867784A0C}" type="datetimeFigureOut">
               <a:rPr lang="en-US" smtClean="0"/>
-              <a:t>7/25/2019</a:t>
+              <a:t>8/4/2019</a:t>
             </a:fld>
             <a:endParaRPr lang="en-US"/>
           </a:p>
@@ -2933,7 +2985,7 @@
           <a:p>
             <a:fld id="{5FC93890-602C-48CB-AE8E-BB8867784A0C}" type="datetimeFigureOut">
               <a:rPr lang="en-US" smtClean="0"/>
-              <a:t>7/25/2019</a:t>
+              <a:t>8/4/2019</a:t>
             </a:fld>
             <a:endParaRPr lang="en-US"/>
           </a:p>
@@ -3247,7 +3299,7 @@
           <a:p>
             <a:fld id="{5FC93890-602C-48CB-AE8E-BB8867784A0C}" type="datetimeFigureOut">
               <a:rPr lang="en-US" smtClean="0"/>
-              <a:t>7/25/2019</a:t>
+              <a:t>8/4/2019</a:t>
             </a:fld>
             <a:endParaRPr lang="en-US"/>
           </a:p>
@@ -3640,7 +3692,7 @@
           <a:p>
             <a:fld id="{5FC93890-602C-48CB-AE8E-BB8867784A0C}" type="datetimeFigureOut">
               <a:rPr lang="en-US" smtClean="0"/>
-              <a:t>7/25/2019</a:t>
+              <a:t>8/4/2019</a:t>
             </a:fld>
             <a:endParaRPr lang="en-US"/>
           </a:p>
@@ -3810,7 +3862,7 @@
           <a:p>
             <a:fld id="{5FC93890-602C-48CB-AE8E-BB8867784A0C}" type="datetimeFigureOut">
               <a:rPr lang="en-US" smtClean="0"/>
-              <a:t>7/25/2019</a:t>
+              <a:t>8/4/2019</a:t>
             </a:fld>
             <a:endParaRPr lang="en-US"/>
           </a:p>
@@ -3990,7 +4042,7 @@
           <a:p>
             <a:fld id="{5FC93890-602C-48CB-AE8E-BB8867784A0C}" type="datetimeFigureOut">
               <a:rPr lang="en-US" smtClean="0"/>
-              <a:t>7/25/2019</a:t>
+              <a:t>8/4/2019</a:t>
             </a:fld>
             <a:endParaRPr lang="en-US"/>
           </a:p>
@@ -4166,7 +4218,7 @@
           <a:p>
             <a:fld id="{5FC93890-602C-48CB-AE8E-BB8867784A0C}" type="datetimeFigureOut">
               <a:rPr lang="en-US" smtClean="0"/>
-              <a:t>7/25/2019</a:t>
+              <a:t>8/4/2019</a:t>
             </a:fld>
             <a:endParaRPr lang="en-US"/>
           </a:p>
@@ -4413,7 +4465,7 @@
           <a:p>
             <a:fld id="{5FC93890-602C-48CB-AE8E-BB8867784A0C}" type="datetimeFigureOut">
               <a:rPr lang="en-US" smtClean="0"/>
-              <a:t>7/25/2019</a:t>
+              <a:t>8/4/2019</a:t>
             </a:fld>
             <a:endParaRPr lang="en-US"/>
           </a:p>
@@ -4645,7 +4697,7 @@
           <a:p>
             <a:fld id="{5FC93890-602C-48CB-AE8E-BB8867784A0C}" type="datetimeFigureOut">
               <a:rPr lang="en-US" smtClean="0"/>
-              <a:t>7/25/2019</a:t>
+              <a:t>8/4/2019</a:t>
             </a:fld>
             <a:endParaRPr lang="en-US"/>
           </a:p>
@@ -5019,7 +5071,7 @@
           <a:p>
             <a:fld id="{5FC93890-602C-48CB-AE8E-BB8867784A0C}" type="datetimeFigureOut">
               <a:rPr lang="en-US" smtClean="0"/>
-              <a:t>7/25/2019</a:t>
+              <a:t>8/4/2019</a:t>
             </a:fld>
             <a:endParaRPr lang="en-US"/>
           </a:p>
@@ -5142,7 +5194,7 @@
           <a:p>
             <a:fld id="{5FC93890-602C-48CB-AE8E-BB8867784A0C}" type="datetimeFigureOut">
               <a:rPr lang="en-US" smtClean="0"/>
-              <a:t>7/25/2019</a:t>
+              <a:t>8/4/2019</a:t>
             </a:fld>
             <a:endParaRPr lang="en-US"/>
           </a:p>
@@ -5237,7 +5289,7 @@
           <a:p>
             <a:fld id="{5FC93890-602C-48CB-AE8E-BB8867784A0C}" type="datetimeFigureOut">
               <a:rPr lang="en-US" smtClean="0"/>
-              <a:t>7/25/2019</a:t>
+              <a:t>8/4/2019</a:t>
             </a:fld>
             <a:endParaRPr lang="en-US"/>
           </a:p>
@@ -5492,7 +5544,7 @@
           <a:p>
             <a:fld id="{5FC93890-602C-48CB-AE8E-BB8867784A0C}" type="datetimeFigureOut">
               <a:rPr lang="en-US" smtClean="0"/>
-              <a:t>7/25/2019</a:t>
+              <a:t>8/4/2019</a:t>
             </a:fld>
             <a:endParaRPr lang="en-US"/>
           </a:p>
@@ -5755,7 +5807,7 @@
           <a:p>
             <a:fld id="{5FC93890-602C-48CB-AE8E-BB8867784A0C}" type="datetimeFigureOut">
               <a:rPr lang="en-US" smtClean="0"/>
-              <a:t>7/25/2019</a:t>
+              <a:t>8/4/2019</a:t>
             </a:fld>
             <a:endParaRPr lang="en-US"/>
           </a:p>
@@ -6498,7 +6550,7 @@
           <a:p>
             <a:fld id="{5FC93890-602C-48CB-AE8E-BB8867784A0C}" type="datetimeFigureOut">
               <a:rPr lang="en-US" smtClean="0"/>
-              <a:t>7/25/2019</a:t>
+              <a:t>8/4/2019</a:t>
             </a:fld>
             <a:endParaRPr lang="en-US"/>
           </a:p>
@@ -7182,7 +7234,7 @@
           <p:cNvPr id="2" name="Title 1">
             <a:extLst>
               <a:ext uri="{FF2B5EF4-FFF2-40B4-BE49-F238E27FC236}">
-                <a16:creationId xmlns:a16="http://schemas.microsoft.com/office/drawing/2014/main" id="{78F2687B-1DAD-4E58-94AC-1009C9CF1721}"/>
+                <a16:creationId xmlns:a16="http://schemas.microsoft.com/office/drawing/2014/main" id="{2690E908-172A-4937-BD8F-9D4757B9318C}"/>
               </a:ext>
             </a:extLst>
           </p:cNvPr>
@@ -7200,7 +7252,7 @@
           <a:p>
             <a:r>
               <a:rPr lang="en-US" dirty="0"/>
-              <a:t>References</a:t>
+              <a:t>Common Parameters Demo</a:t>
             </a:r>
           </a:p>
         </p:txBody>
@@ -7210,7 +7262,7 @@
           <p:cNvPr id="3" name="Content Placeholder 2">
             <a:extLst>
               <a:ext uri="{FF2B5EF4-FFF2-40B4-BE49-F238E27FC236}">
-                <a16:creationId xmlns:a16="http://schemas.microsoft.com/office/drawing/2014/main" id="{B878F1E6-3C4D-4BDE-825C-E244F9657F36}"/>
+                <a16:creationId xmlns:a16="http://schemas.microsoft.com/office/drawing/2014/main" id="{CBBA524B-3AAF-4165-AE0E-3EBCE460E51E}"/>
               </a:ext>
             </a:extLst>
           </p:cNvPr>
@@ -7223,19 +7275,17 @@
         </p:nvSpPr>
         <p:spPr/>
         <p:txBody>
-          <a:bodyPr>
-            <a:normAutofit/>
-          </a:bodyPr>
-          <a:lstStyle/>
-          <a:p>
-            <a:endParaRPr lang="en-US" sz="2000" dirty="0"/>
+          <a:bodyPr/>
+          <a:lstStyle/>
+          <a:p>
+            <a:endParaRPr lang="en-US" dirty="0"/>
           </a:p>
         </p:txBody>
       </p:sp>
     </p:spTree>
     <p:extLst>
       <p:ext uri="{BB962C8B-B14F-4D97-AF65-F5344CB8AC3E}">
-        <p14:creationId xmlns:p14="http://schemas.microsoft.com/office/powerpoint/2010/main" val="3846218459"/>
+        <p14:creationId xmlns:p14="http://schemas.microsoft.com/office/powerpoint/2010/main" val="288791099"/>
       </p:ext>
     </p:extLst>
   </p:cSld>
@@ -7267,7 +7317,7 @@
           <p:cNvPr id="2" name="Title 1">
             <a:extLst>
               <a:ext uri="{FF2B5EF4-FFF2-40B4-BE49-F238E27FC236}">
-                <a16:creationId xmlns:a16="http://schemas.microsoft.com/office/drawing/2014/main" id="{22148B53-20C2-40D5-8A40-BECCBD847254}"/>
+                <a16:creationId xmlns:a16="http://schemas.microsoft.com/office/drawing/2014/main" id="{500EBBEA-0F88-4D9D-B141-3AEF4906C399}"/>
               </a:ext>
             </a:extLst>
           </p:cNvPr>
@@ -7285,7 +7335,7 @@
           <a:p>
             <a:r>
               <a:rPr lang="en-US" dirty="0"/>
-              <a:t>More Reading</a:t>
+              <a:t>Logic statements</a:t>
             </a:r>
           </a:p>
         </p:txBody>
@@ -7295,7 +7345,7 @@
           <p:cNvPr id="3" name="Content Placeholder 2">
             <a:extLst>
               <a:ext uri="{FF2B5EF4-FFF2-40B4-BE49-F238E27FC236}">
-                <a16:creationId xmlns:a16="http://schemas.microsoft.com/office/drawing/2014/main" id="{D553982B-64CD-4637-ADA9-6F8CA958B6E6}"/>
+                <a16:creationId xmlns:a16="http://schemas.microsoft.com/office/drawing/2014/main" id="{02A1F441-944D-4A05-9638-A1DF101B706C}"/>
               </a:ext>
             </a:extLst>
           </p:cNvPr>
@@ -7314,38 +7364,20 @@
           <a:lstStyle/>
           <a:p>
             <a:r>
-              <a:rPr lang="en-US" sz="2000" dirty="0">
-                <a:hlinkClick r:id="rId2"/>
-              </a:rPr>
-              <a:t>PowerShell in a Month of Lunches – Don Jones &amp; Jeff Hicks</a:t>
-            </a:r>
+              <a:rPr lang="en-US" sz="2000" dirty="0"/>
+              <a:t>Logic statements allow us to control the flow of our script</a:t>
+            </a:r>
+          </a:p>
+          <a:p>
             <a:endParaRPr lang="en-US" sz="2000" dirty="0"/>
           </a:p>
           <a:p>
-            <a:pPr marL="0" indent="0">
-              <a:buNone/>
-            </a:pPr>
-            <a:endParaRPr lang="en-US" sz="2000" dirty="0"/>
-          </a:p>
-          <a:p>
-            <a:r>
-              <a:rPr lang="en-US" sz="2000" dirty="0">
-                <a:hlinkClick r:id="rId3"/>
-              </a:rPr>
-              <a:t>https://leanpub.com/powershell101</a:t>
-            </a:r>
-            <a:endParaRPr lang="en-US" sz="2000" dirty="0"/>
-          </a:p>
-          <a:p>
-            <a:endParaRPr lang="en-US" sz="2000" dirty="0"/>
-          </a:p>
-          <a:p>
-            <a:r>
-              <a:rPr lang="en-US" sz="2000" dirty="0">
-                <a:hlinkClick r:id="rId4"/>
-              </a:rPr>
-              <a:t>https://docs.microsoft.com/en-us/powershell/</a:t>
-            </a:r>
+            <a:r>
+              <a:rPr lang="en-US" sz="2000" dirty="0"/>
+              <a:t>They include; foreach, for, if, switch, do/while</a:t>
+            </a:r>
+          </a:p>
+          <a:p>
             <a:endParaRPr lang="en-US" sz="2000" dirty="0"/>
           </a:p>
           <a:p>
@@ -7356,7 +7388,7 @@
     </p:spTree>
     <p:extLst>
       <p:ext uri="{BB962C8B-B14F-4D97-AF65-F5344CB8AC3E}">
-        <p14:creationId xmlns:p14="http://schemas.microsoft.com/office/powerpoint/2010/main" val="1832739366"/>
+        <p14:creationId xmlns:p14="http://schemas.microsoft.com/office/powerpoint/2010/main" val="2911154948"/>
       </p:ext>
     </p:extLst>
   </p:cSld>
@@ -7388,6 +7420,407 @@
           <p:cNvPr id="2" name="Title 1">
             <a:extLst>
               <a:ext uri="{FF2B5EF4-FFF2-40B4-BE49-F238E27FC236}">
+                <a16:creationId xmlns:a16="http://schemas.microsoft.com/office/drawing/2014/main" id="{9F9C06FF-F88A-4AB0-AB3D-AB7D891F8578}"/>
+              </a:ext>
+            </a:extLst>
+          </p:cNvPr>
+          <p:cNvSpPr>
+            <a:spLocks noGrp="1"/>
+          </p:cNvSpPr>
+          <p:nvPr>
+            <p:ph type="title"/>
+          </p:nvPr>
+        </p:nvSpPr>
+        <p:spPr/>
+        <p:txBody>
+          <a:bodyPr/>
+          <a:lstStyle/>
+          <a:p>
+            <a:r>
+              <a:rPr lang="en-US" dirty="0"/>
+              <a:t>Logic Statements Demo</a:t>
+            </a:r>
+          </a:p>
+        </p:txBody>
+      </p:sp>
+      <p:sp>
+        <p:nvSpPr>
+          <p:cNvPr id="3" name="Content Placeholder 2">
+            <a:extLst>
+              <a:ext uri="{FF2B5EF4-FFF2-40B4-BE49-F238E27FC236}">
+                <a16:creationId xmlns:a16="http://schemas.microsoft.com/office/drawing/2014/main" id="{56E996BD-40AE-44EC-88C4-67AF3EC5F8C3}"/>
+              </a:ext>
+            </a:extLst>
+          </p:cNvPr>
+          <p:cNvSpPr>
+            <a:spLocks noGrp="1"/>
+          </p:cNvSpPr>
+          <p:nvPr>
+            <p:ph idx="1"/>
+          </p:nvPr>
+        </p:nvSpPr>
+        <p:spPr/>
+        <p:txBody>
+          <a:bodyPr/>
+          <a:lstStyle/>
+          <a:p>
+            <a:endParaRPr lang="en-US"/>
+          </a:p>
+        </p:txBody>
+      </p:sp>
+    </p:spTree>
+    <p:extLst>
+      <p:ext uri="{BB962C8B-B14F-4D97-AF65-F5344CB8AC3E}">
+        <p14:creationId xmlns:p14="http://schemas.microsoft.com/office/powerpoint/2010/main" val="2862849544"/>
+      </p:ext>
+    </p:extLst>
+  </p:cSld>
+  <p:clrMapOvr>
+    <a:masterClrMapping/>
+  </p:clrMapOvr>
+</p:sld>
+</file>
+
+<file path=ppt/slides/slide13.xml><?xml version="1.0" encoding="utf-8"?>
+<p:sld xmlns:a="http://schemas.openxmlformats.org/drawingml/2006/main" xmlns:r="http://schemas.openxmlformats.org/officeDocument/2006/relationships" xmlns:p="http://schemas.openxmlformats.org/presentationml/2006/main">
+  <p:cSld>
+    <p:spTree>
+      <p:nvGrpSpPr>
+        <p:cNvPr id="1" name=""/>
+        <p:cNvGrpSpPr/>
+        <p:nvPr/>
+      </p:nvGrpSpPr>
+      <p:grpSpPr>
+        <a:xfrm>
+          <a:off x="0" y="0"/>
+          <a:ext cx="0" cy="0"/>
+          <a:chOff x="0" y="0"/>
+          <a:chExt cx="0" cy="0"/>
+        </a:xfrm>
+      </p:grpSpPr>
+      <p:sp>
+        <p:nvSpPr>
+          <p:cNvPr id="2" name="Title 1">
+            <a:extLst>
+              <a:ext uri="{FF2B5EF4-FFF2-40B4-BE49-F238E27FC236}">
+                <a16:creationId xmlns:a16="http://schemas.microsoft.com/office/drawing/2014/main" id="{99602E41-ED1C-4A83-BE1D-5F9666860B77}"/>
+              </a:ext>
+            </a:extLst>
+          </p:cNvPr>
+          <p:cNvSpPr>
+            <a:spLocks noGrp="1"/>
+          </p:cNvSpPr>
+          <p:nvPr>
+            <p:ph type="title"/>
+          </p:nvPr>
+        </p:nvSpPr>
+        <p:spPr/>
+        <p:txBody>
+          <a:bodyPr/>
+          <a:lstStyle/>
+          <a:p>
+            <a:r>
+              <a:rPr lang="en-US" dirty="0"/>
+              <a:t>Homework</a:t>
+            </a:r>
+          </a:p>
+        </p:txBody>
+      </p:sp>
+      <p:sp>
+        <p:nvSpPr>
+          <p:cNvPr id="3" name="Content Placeholder 2">
+            <a:extLst>
+              <a:ext uri="{FF2B5EF4-FFF2-40B4-BE49-F238E27FC236}">
+                <a16:creationId xmlns:a16="http://schemas.microsoft.com/office/drawing/2014/main" id="{55FCA305-1E34-48DC-B6A1-2B90AB65F525}"/>
+              </a:ext>
+            </a:extLst>
+          </p:cNvPr>
+          <p:cNvSpPr>
+            <a:spLocks noGrp="1"/>
+          </p:cNvSpPr>
+          <p:nvPr>
+            <p:ph idx="1"/>
+          </p:nvPr>
+        </p:nvSpPr>
+        <p:spPr/>
+        <p:txBody>
+          <a:bodyPr>
+            <a:normAutofit/>
+          </a:bodyPr>
+          <a:lstStyle/>
+          <a:p>
+            <a:r>
+              <a:rPr lang="en-US" sz="2000" dirty="0"/>
+              <a:t>Silence errors that may occur when you try to use Remove-Item on a Path that is not there.</a:t>
+            </a:r>
+          </a:p>
+          <a:p>
+            <a:endParaRPr lang="en-US" sz="2000" dirty="0"/>
+          </a:p>
+          <a:p>
+            <a:r>
+              <a:rPr lang="en-US" sz="2000" dirty="0"/>
+              <a:t>Foreach Notepad process open, Ping google.com</a:t>
+            </a:r>
+          </a:p>
+          <a:p>
+            <a:endParaRPr lang="en-US" sz="2000" dirty="0"/>
+          </a:p>
+          <a:p>
+            <a:r>
+              <a:rPr lang="en-US" sz="2000" dirty="0"/>
+              <a:t>Create your own function (can use example 2 as a jumping point)</a:t>
+            </a:r>
+          </a:p>
+        </p:txBody>
+      </p:sp>
+    </p:spTree>
+    <p:extLst>
+      <p:ext uri="{BB962C8B-B14F-4D97-AF65-F5344CB8AC3E}">
+        <p14:creationId xmlns:p14="http://schemas.microsoft.com/office/powerpoint/2010/main" val="4217542822"/>
+      </p:ext>
+    </p:extLst>
+  </p:cSld>
+  <p:clrMapOvr>
+    <a:masterClrMapping/>
+  </p:clrMapOvr>
+</p:sld>
+</file>
+
+<file path=ppt/slides/slide14.xml><?xml version="1.0" encoding="utf-8"?>
+<p:sld xmlns:a="http://schemas.openxmlformats.org/drawingml/2006/main" xmlns:r="http://schemas.openxmlformats.org/officeDocument/2006/relationships" xmlns:p="http://schemas.openxmlformats.org/presentationml/2006/main">
+  <p:cSld>
+    <p:spTree>
+      <p:nvGrpSpPr>
+        <p:cNvPr id="1" name=""/>
+        <p:cNvGrpSpPr/>
+        <p:nvPr/>
+      </p:nvGrpSpPr>
+      <p:grpSpPr>
+        <a:xfrm>
+          <a:off x="0" y="0"/>
+          <a:ext cx="0" cy="0"/>
+          <a:chOff x="0" y="0"/>
+          <a:chExt cx="0" cy="0"/>
+        </a:xfrm>
+      </p:grpSpPr>
+      <p:sp>
+        <p:nvSpPr>
+          <p:cNvPr id="2" name="Title 1">
+            <a:extLst>
+              <a:ext uri="{FF2B5EF4-FFF2-40B4-BE49-F238E27FC236}">
+                <a16:creationId xmlns:a16="http://schemas.microsoft.com/office/drawing/2014/main" id="{78F2687B-1DAD-4E58-94AC-1009C9CF1721}"/>
+              </a:ext>
+            </a:extLst>
+          </p:cNvPr>
+          <p:cNvSpPr>
+            <a:spLocks noGrp="1"/>
+          </p:cNvSpPr>
+          <p:nvPr>
+            <p:ph type="title"/>
+          </p:nvPr>
+        </p:nvSpPr>
+        <p:spPr/>
+        <p:txBody>
+          <a:bodyPr/>
+          <a:lstStyle/>
+          <a:p>
+            <a:r>
+              <a:rPr lang="en-US" dirty="0"/>
+              <a:t>References</a:t>
+            </a:r>
+          </a:p>
+        </p:txBody>
+      </p:sp>
+      <p:sp>
+        <p:nvSpPr>
+          <p:cNvPr id="3" name="Content Placeholder 2">
+            <a:extLst>
+              <a:ext uri="{FF2B5EF4-FFF2-40B4-BE49-F238E27FC236}">
+                <a16:creationId xmlns:a16="http://schemas.microsoft.com/office/drawing/2014/main" id="{B878F1E6-3C4D-4BDE-825C-E244F9657F36}"/>
+              </a:ext>
+            </a:extLst>
+          </p:cNvPr>
+          <p:cNvSpPr>
+            <a:spLocks noGrp="1"/>
+          </p:cNvSpPr>
+          <p:nvPr>
+            <p:ph idx="1"/>
+          </p:nvPr>
+        </p:nvSpPr>
+        <p:spPr/>
+        <p:txBody>
+          <a:bodyPr>
+            <a:normAutofit/>
+          </a:bodyPr>
+          <a:lstStyle/>
+          <a:p>
+            <a:r>
+              <a:rPr lang="en-US" sz="2000" dirty="0">
+                <a:hlinkClick r:id="rId2"/>
+              </a:rPr>
+              <a:t>https://docs.microsoft.com/en-us/powershell/module/microsoft.powershell.core/about/about_commonparameters?view=powershell-6</a:t>
+            </a:r>
+            <a:endParaRPr lang="en-US" sz="2000" dirty="0"/>
+          </a:p>
+        </p:txBody>
+      </p:sp>
+    </p:spTree>
+    <p:extLst>
+      <p:ext uri="{BB962C8B-B14F-4D97-AF65-F5344CB8AC3E}">
+        <p14:creationId xmlns:p14="http://schemas.microsoft.com/office/powerpoint/2010/main" val="3846218459"/>
+      </p:ext>
+    </p:extLst>
+  </p:cSld>
+  <p:clrMapOvr>
+    <a:masterClrMapping/>
+  </p:clrMapOvr>
+</p:sld>
+</file>
+
+<file path=ppt/slides/slide15.xml><?xml version="1.0" encoding="utf-8"?>
+<p:sld xmlns:a="http://schemas.openxmlformats.org/drawingml/2006/main" xmlns:r="http://schemas.openxmlformats.org/officeDocument/2006/relationships" xmlns:p="http://schemas.openxmlformats.org/presentationml/2006/main">
+  <p:cSld>
+    <p:spTree>
+      <p:nvGrpSpPr>
+        <p:cNvPr id="1" name=""/>
+        <p:cNvGrpSpPr/>
+        <p:nvPr/>
+      </p:nvGrpSpPr>
+      <p:grpSpPr>
+        <a:xfrm>
+          <a:off x="0" y="0"/>
+          <a:ext cx="0" cy="0"/>
+          <a:chOff x="0" y="0"/>
+          <a:chExt cx="0" cy="0"/>
+        </a:xfrm>
+      </p:grpSpPr>
+      <p:sp>
+        <p:nvSpPr>
+          <p:cNvPr id="2" name="Title 1">
+            <a:extLst>
+              <a:ext uri="{FF2B5EF4-FFF2-40B4-BE49-F238E27FC236}">
+                <a16:creationId xmlns:a16="http://schemas.microsoft.com/office/drawing/2014/main" id="{22148B53-20C2-40D5-8A40-BECCBD847254}"/>
+              </a:ext>
+            </a:extLst>
+          </p:cNvPr>
+          <p:cNvSpPr>
+            <a:spLocks noGrp="1"/>
+          </p:cNvSpPr>
+          <p:nvPr>
+            <p:ph type="title"/>
+          </p:nvPr>
+        </p:nvSpPr>
+        <p:spPr/>
+        <p:txBody>
+          <a:bodyPr/>
+          <a:lstStyle/>
+          <a:p>
+            <a:r>
+              <a:rPr lang="en-US" dirty="0"/>
+              <a:t>More Reading</a:t>
+            </a:r>
+          </a:p>
+        </p:txBody>
+      </p:sp>
+      <p:sp>
+        <p:nvSpPr>
+          <p:cNvPr id="3" name="Content Placeholder 2">
+            <a:extLst>
+              <a:ext uri="{FF2B5EF4-FFF2-40B4-BE49-F238E27FC236}">
+                <a16:creationId xmlns:a16="http://schemas.microsoft.com/office/drawing/2014/main" id="{D553982B-64CD-4637-ADA9-6F8CA958B6E6}"/>
+              </a:ext>
+            </a:extLst>
+          </p:cNvPr>
+          <p:cNvSpPr>
+            <a:spLocks noGrp="1"/>
+          </p:cNvSpPr>
+          <p:nvPr>
+            <p:ph idx="1"/>
+          </p:nvPr>
+        </p:nvSpPr>
+        <p:spPr/>
+        <p:txBody>
+          <a:bodyPr>
+            <a:normAutofit/>
+          </a:bodyPr>
+          <a:lstStyle/>
+          <a:p>
+            <a:r>
+              <a:rPr lang="en-US" sz="2000" dirty="0">
+                <a:hlinkClick r:id="rId2"/>
+              </a:rPr>
+              <a:t>PowerShell in a Month of Lunches – Don Jones &amp; Jeff Hicks</a:t>
+            </a:r>
+            <a:endParaRPr lang="en-US" sz="2000" dirty="0"/>
+          </a:p>
+          <a:p>
+            <a:pPr marL="0" indent="0">
+              <a:buNone/>
+            </a:pPr>
+            <a:endParaRPr lang="en-US" sz="2000" dirty="0"/>
+          </a:p>
+          <a:p>
+            <a:r>
+              <a:rPr lang="en-US" sz="2000" dirty="0">
+                <a:hlinkClick r:id="rId3"/>
+              </a:rPr>
+              <a:t>https://leanpub.com/powershell101</a:t>
+            </a:r>
+            <a:endParaRPr lang="en-US" sz="2000" dirty="0"/>
+          </a:p>
+          <a:p>
+            <a:endParaRPr lang="en-US" sz="2000" dirty="0"/>
+          </a:p>
+          <a:p>
+            <a:r>
+              <a:rPr lang="en-US" sz="2000" dirty="0">
+                <a:hlinkClick r:id="rId4"/>
+              </a:rPr>
+              <a:t>https://docs.microsoft.com/en-us/powershell/</a:t>
+            </a:r>
+            <a:endParaRPr lang="en-US" sz="2000" dirty="0"/>
+          </a:p>
+          <a:p>
+            <a:endParaRPr lang="en-US" sz="2000" dirty="0"/>
+          </a:p>
+        </p:txBody>
+      </p:sp>
+    </p:spTree>
+    <p:extLst>
+      <p:ext uri="{BB962C8B-B14F-4D97-AF65-F5344CB8AC3E}">
+        <p14:creationId xmlns:p14="http://schemas.microsoft.com/office/powerpoint/2010/main" val="1832739366"/>
+      </p:ext>
+    </p:extLst>
+  </p:cSld>
+  <p:clrMapOvr>
+    <a:masterClrMapping/>
+  </p:clrMapOvr>
+</p:sld>
+</file>
+
+<file path=ppt/slides/slide16.xml><?xml version="1.0" encoding="utf-8"?>
+<p:sld xmlns:a="http://schemas.openxmlformats.org/drawingml/2006/main" xmlns:r="http://schemas.openxmlformats.org/officeDocument/2006/relationships" xmlns:p="http://schemas.openxmlformats.org/presentationml/2006/main">
+  <p:cSld>
+    <p:spTree>
+      <p:nvGrpSpPr>
+        <p:cNvPr id="1" name=""/>
+        <p:cNvGrpSpPr/>
+        <p:nvPr/>
+      </p:nvGrpSpPr>
+      <p:grpSpPr>
+        <a:xfrm>
+          <a:off x="0" y="0"/>
+          <a:ext cx="0" cy="0"/>
+          <a:chOff x="0" y="0"/>
+          <a:chExt cx="0" cy="0"/>
+        </a:xfrm>
+      </p:grpSpPr>
+      <p:sp>
+        <p:nvSpPr>
+          <p:cNvPr id="2" name="Title 1">
+            <a:extLst>
+              <a:ext uri="{FF2B5EF4-FFF2-40B4-BE49-F238E27FC236}">
                 <a16:creationId xmlns:a16="http://schemas.microsoft.com/office/drawing/2014/main" id="{15579AF1-31CA-42EA-ABF8-163A5F08EFE2}"/>
               </a:ext>
             </a:extLst>
@@ -7429,12 +7862,31 @@
         </p:nvSpPr>
         <p:spPr/>
         <p:txBody>
-          <a:bodyPr/>
-          <a:lstStyle/>
-          <a:p>
-            <a:r>
-              <a:rPr lang="en-US" dirty="0"/>
-              <a:t>Is there a discipline or PowerShell you want to see a deeper dive of?</a:t>
+          <a:bodyPr>
+            <a:normAutofit/>
+          </a:bodyPr>
+          <a:lstStyle/>
+          <a:p>
+            <a:r>
+              <a:rPr lang="en-US" sz="2000" dirty="0"/>
+              <a:t>Is there a </a:t>
+            </a:r>
+            <a:r>
+              <a:rPr lang="en-US" sz="2000"/>
+              <a:t>discipline of </a:t>
+            </a:r>
+            <a:r>
+              <a:rPr lang="en-US" sz="2000" dirty="0"/>
+              <a:t>PowerShell you want to see a deeper dive of? i.e. Active Directory, Files Manipulation, Cloud/Azure.</a:t>
+            </a:r>
+          </a:p>
+          <a:p>
+            <a:endParaRPr lang="en-US" sz="2000" dirty="0"/>
+          </a:p>
+          <a:p>
+            <a:r>
+              <a:rPr lang="en-US" sz="2000" dirty="0"/>
+              <a:t>What topics would you like to see covered at the User Group?</a:t>
             </a:r>
           </a:p>
         </p:txBody>
@@ -8216,7 +8668,7 @@
           <p:cNvPr id="2" name="Title 1">
             <a:extLst>
               <a:ext uri="{FF2B5EF4-FFF2-40B4-BE49-F238E27FC236}">
-                <a16:creationId xmlns:a16="http://schemas.microsoft.com/office/drawing/2014/main" id="{99602E41-ED1C-4A83-BE1D-5F9666860B77}"/>
+                <a16:creationId xmlns:a16="http://schemas.microsoft.com/office/drawing/2014/main" id="{6479F861-8A98-4E1F-8F7E-3CA416C43E80}"/>
               </a:ext>
             </a:extLst>
           </p:cNvPr>
@@ -8234,7 +8686,7 @@
           <a:p>
             <a:r>
               <a:rPr lang="en-US" dirty="0"/>
-              <a:t>Homework</a:t>
+              <a:t>Common Parameters</a:t>
             </a:r>
           </a:p>
         </p:txBody>
@@ -8244,7 +8696,7 @@
           <p:cNvPr id="3" name="Content Placeholder 2">
             <a:extLst>
               <a:ext uri="{FF2B5EF4-FFF2-40B4-BE49-F238E27FC236}">
-                <a16:creationId xmlns:a16="http://schemas.microsoft.com/office/drawing/2014/main" id="{55FCA305-1E34-48DC-B6A1-2B90AB65F525}"/>
+                <a16:creationId xmlns:a16="http://schemas.microsoft.com/office/drawing/2014/main" id="{1D8E89C9-E63C-4CAF-A265-3BEA08F979F0}"/>
               </a:ext>
             </a:extLst>
           </p:cNvPr>
@@ -8264,7 +8716,7 @@
           <a:p>
             <a:r>
               <a:rPr lang="en-US" sz="2000" dirty="0"/>
-              <a:t>Silence errors that may occur when you try to use Remove-Item on a Path that is not there.</a:t>
+              <a:t>Parameters to all Microsoft cmdlets and many user defined functions and cmdlets</a:t>
             </a:r>
           </a:p>
           <a:p>
@@ -8273,7 +8725,7 @@
           <a:p>
             <a:r>
               <a:rPr lang="en-US" sz="2000" dirty="0"/>
-              <a:t>Foreach Notepad process open, Ping google.com</a:t>
+              <a:t>They provide extensions such as debugging, logging, and risk mitigation</a:t>
             </a:r>
           </a:p>
           <a:p>
@@ -8282,11 +8734,27 @@
           <a:p>
             <a:r>
               <a:rPr lang="en-US" sz="2000" dirty="0"/>
-              <a:t>Create your own function (can use example 2 as a </a:t>
-            </a:r>
-            <a:r>
-              <a:rPr lang="en-US" sz="2000"/>
-              <a:t>jumping point)</a:t>
+              <a:t>Parameters include –</a:t>
+            </a:r>
+            <a:r>
+              <a:rPr lang="en-US" sz="2000" dirty="0" err="1"/>
+              <a:t>ErrorAction</a:t>
+            </a:r>
+            <a:r>
+              <a:rPr lang="en-US" sz="2000" dirty="0"/>
+              <a:t>, -Debug, -</a:t>
+            </a:r>
+            <a:r>
+              <a:rPr lang="en-US" sz="2000" dirty="0" err="1"/>
+              <a:t>OutVariable</a:t>
+            </a:r>
+            <a:r>
+              <a:rPr lang="en-US" sz="2000" dirty="0"/>
+              <a:t>, -</a:t>
+            </a:r>
+            <a:r>
+              <a:rPr lang="en-US" sz="2000" dirty="0" err="1"/>
+              <a:t>WhatIf</a:t>
             </a:r>
             <a:endParaRPr lang="en-US" sz="2000" dirty="0"/>
           </a:p>
@@ -8295,7 +8763,7 @@
     </p:spTree>
     <p:extLst>
       <p:ext uri="{BB962C8B-B14F-4D97-AF65-F5344CB8AC3E}">
-        <p14:creationId xmlns:p14="http://schemas.microsoft.com/office/powerpoint/2010/main" val="4217542822"/>
+        <p14:creationId xmlns:p14="http://schemas.microsoft.com/office/powerpoint/2010/main" val="2779347125"/>
       </p:ext>
     </p:extLst>
   </p:cSld>

</xml_diff>